<commit_message>
touch ups on slides
</commit_message>
<xml_diff>
--- a/slides/Trees-SegmentTrees.pptx
+++ b/slides/Trees-SegmentTrees.pptx
@@ -239,7 +239,7 @@
           <a:p>
             <a:fld id="{C5B45307-6ED4-B142-BD64-10F739779302}" type="datetimeFigureOut">
               <a:rPr lang="en-US" smtClean="0"/>
-              <a:t>2/3/26</a:t>
+              <a:t>2/5/26</a:t>
             </a:fld>
             <a:endParaRPr lang="en-US"/>
           </a:p>
@@ -899,7 +899,7 @@
           <a:noFill/>
           <a:extLst>
             <a:ext uri="{909E8E84-426E-40dd-AFC4-6F175D3DCCD1}">
-              <a14:hiddenFill xmlns="" xmlns:a14="http://schemas.microsoft.com/office/drawing/2010/main">
+              <a14:hiddenFill xmlns:a14="http://schemas.microsoft.com/office/drawing/2010/main" xmlns="">
                 <a:solidFill>
                   <a:srgbClr val="FFFFFF"/>
                 </a:solidFill>
@@ -958,7 +958,7 @@
             </a:ln>
             <a:extLst>
               <a:ext uri="{91240B29-F687-4f45-9708-019B960494DF}">
-                <a14:hiddenLine xmlns="" xmlns:a14="http://schemas.microsoft.com/office/drawing/2010/main" w="9525">
+                <a14:hiddenLine xmlns:a14="http://schemas.microsoft.com/office/drawing/2010/main" xmlns="" w="9525">
                   <a:solidFill>
                     <a:srgbClr val="000000"/>
                   </a:solidFill>
@@ -1048,7 +1048,7 @@
             </a:ln>
             <a:extLst>
               <a:ext uri="{91240B29-F687-4f45-9708-019B960494DF}">
-                <a14:hiddenLine xmlns="" xmlns:a14="http://schemas.microsoft.com/office/drawing/2010/main" w="9525">
+                <a14:hiddenLine xmlns:a14="http://schemas.microsoft.com/office/drawing/2010/main" xmlns="" w="9525">
                   <a:solidFill>
                     <a:srgbClr val="000000"/>
                   </a:solidFill>
@@ -1138,7 +1138,7 @@
             </a:ln>
             <a:extLst>
               <a:ext uri="{91240B29-F687-4f45-9708-019B960494DF}">
-                <a14:hiddenLine xmlns="" xmlns:a14="http://schemas.microsoft.com/office/drawing/2010/main" w="9525">
+                <a14:hiddenLine xmlns:a14="http://schemas.microsoft.com/office/drawing/2010/main" xmlns="" w="9525">
                   <a:solidFill>
                     <a:srgbClr val="000000"/>
                   </a:solidFill>
@@ -1172,7 +1172,7 @@
             </a:ln>
             <a:extLst>
               <a:ext uri="{91240B29-F687-4f45-9708-019B960494DF}">
-                <a14:hiddenLine xmlns="" xmlns:a14="http://schemas.microsoft.com/office/drawing/2010/main" w="9525">
+                <a14:hiddenLine xmlns:a14="http://schemas.microsoft.com/office/drawing/2010/main" xmlns="" w="9525">
                   <a:solidFill>
                     <a:srgbClr val="000000"/>
                   </a:solidFill>
@@ -1262,7 +1262,7 @@
             </a:ln>
             <a:extLst>
               <a:ext uri="{91240B29-F687-4f45-9708-019B960494DF}">
-                <a14:hiddenLine xmlns="" xmlns:a14="http://schemas.microsoft.com/office/drawing/2010/main" w="9525">
+                <a14:hiddenLine xmlns:a14="http://schemas.microsoft.com/office/drawing/2010/main" xmlns="" w="9525">
                   <a:solidFill>
                     <a:srgbClr val="000000"/>
                   </a:solidFill>
@@ -1324,7 +1324,7 @@
             </a:ln>
             <a:extLst>
               <a:ext uri="{91240B29-F687-4f45-9708-019B960494DF}">
-                <a14:hiddenLine xmlns="" xmlns:a14="http://schemas.microsoft.com/office/drawing/2010/main" w="9525">
+                <a14:hiddenLine xmlns:a14="http://schemas.microsoft.com/office/drawing/2010/main" xmlns="" w="9525">
                   <a:solidFill>
                     <a:srgbClr val="000000"/>
                   </a:solidFill>
@@ -1386,7 +1386,7 @@
             </a:ln>
             <a:extLst>
               <a:ext uri="{91240B29-F687-4f45-9708-019B960494DF}">
-                <a14:hiddenLine xmlns="" xmlns:a14="http://schemas.microsoft.com/office/drawing/2010/main" w="9525">
+                <a14:hiddenLine xmlns:a14="http://schemas.microsoft.com/office/drawing/2010/main" xmlns="" w="9525">
                   <a:solidFill>
                     <a:srgbClr val="000000"/>
                   </a:solidFill>
@@ -1476,7 +1476,7 @@
             </a:ln>
             <a:extLst>
               <a:ext uri="{91240B29-F687-4f45-9708-019B960494DF}">
-                <a14:hiddenLine xmlns="" xmlns:a14="http://schemas.microsoft.com/office/drawing/2010/main" w="9525">
+                <a14:hiddenLine xmlns:a14="http://schemas.microsoft.com/office/drawing/2010/main" xmlns="" w="9525">
                   <a:solidFill>
                     <a:srgbClr val="000000"/>
                   </a:solidFill>
@@ -1538,7 +1538,7 @@
             </a:ln>
             <a:extLst>
               <a:ext uri="{91240B29-F687-4f45-9708-019B960494DF}">
-                <a14:hiddenLine xmlns="" xmlns:a14="http://schemas.microsoft.com/office/drawing/2010/main" w="9525">
+                <a14:hiddenLine xmlns:a14="http://schemas.microsoft.com/office/drawing/2010/main" xmlns="" w="9525">
                   <a:solidFill>
                     <a:srgbClr val="000000"/>
                   </a:solidFill>
@@ -1600,7 +1600,7 @@
             </a:ln>
             <a:extLst>
               <a:ext uri="{91240B29-F687-4f45-9708-019B960494DF}">
-                <a14:hiddenLine xmlns="" xmlns:a14="http://schemas.microsoft.com/office/drawing/2010/main" w="9525">
+                <a14:hiddenLine xmlns:a14="http://schemas.microsoft.com/office/drawing/2010/main" xmlns="" w="9525">
                   <a:solidFill>
                     <a:srgbClr val="000000"/>
                   </a:solidFill>
@@ -1690,7 +1690,7 @@
             </a:ln>
             <a:extLst>
               <a:ext uri="{91240B29-F687-4f45-9708-019B960494DF}">
-                <a14:hiddenLine xmlns="" xmlns:a14="http://schemas.microsoft.com/office/drawing/2010/main" w="9525">
+                <a14:hiddenLine xmlns:a14="http://schemas.microsoft.com/office/drawing/2010/main" xmlns="" w="9525">
                   <a:solidFill>
                     <a:srgbClr val="000000"/>
                   </a:solidFill>
@@ -1780,7 +1780,7 @@
             </a:ln>
             <a:extLst>
               <a:ext uri="{91240B29-F687-4f45-9708-019B960494DF}">
-                <a14:hiddenLine xmlns="" xmlns:a14="http://schemas.microsoft.com/office/drawing/2010/main" w="9525">
+                <a14:hiddenLine xmlns:a14="http://schemas.microsoft.com/office/drawing/2010/main" xmlns="" w="9525">
                   <a:solidFill>
                     <a:srgbClr val="000000"/>
                   </a:solidFill>
@@ -1842,7 +1842,7 @@
             </a:ln>
             <a:extLst>
               <a:ext uri="{91240B29-F687-4f45-9708-019B960494DF}">
-                <a14:hiddenLine xmlns="" xmlns:a14="http://schemas.microsoft.com/office/drawing/2010/main" w="9525">
+                <a14:hiddenLine xmlns:a14="http://schemas.microsoft.com/office/drawing/2010/main" xmlns="" w="9525">
                   <a:solidFill>
                     <a:srgbClr val="000000"/>
                   </a:solidFill>
@@ -1952,7 +1952,7 @@
             </a:ln>
             <a:extLst>
               <a:ext uri="{91240B29-F687-4f45-9708-019B960494DF}">
-                <a14:hiddenLine xmlns="" xmlns:a14="http://schemas.microsoft.com/office/drawing/2010/main" w="9525">
+                <a14:hiddenLine xmlns:a14="http://schemas.microsoft.com/office/drawing/2010/main" xmlns="" w="9525">
                   <a:solidFill>
                     <a:srgbClr val="000000"/>
                   </a:solidFill>
@@ -2014,7 +2014,7 @@
             </a:ln>
             <a:extLst>
               <a:ext uri="{91240B29-F687-4f45-9708-019B960494DF}">
-                <a14:hiddenLine xmlns="" xmlns:a14="http://schemas.microsoft.com/office/drawing/2010/main" w="9525">
+                <a14:hiddenLine xmlns:a14="http://schemas.microsoft.com/office/drawing/2010/main" xmlns="" w="9525">
                   <a:solidFill>
                     <a:srgbClr val="000000"/>
                   </a:solidFill>
@@ -2104,7 +2104,7 @@
             </a:ln>
             <a:extLst>
               <a:ext uri="{91240B29-F687-4f45-9708-019B960494DF}">
-                <a14:hiddenLine xmlns="" xmlns:a14="http://schemas.microsoft.com/office/drawing/2010/main" w="9525">
+                <a14:hiddenLine xmlns:a14="http://schemas.microsoft.com/office/drawing/2010/main" xmlns="" w="9525">
                   <a:solidFill>
                     <a:srgbClr val="000000"/>
                   </a:solidFill>
@@ -2194,7 +2194,7 @@
             </a:ln>
             <a:extLst>
               <a:ext uri="{91240B29-F687-4f45-9708-019B960494DF}">
-                <a14:hiddenLine xmlns="" xmlns:a14="http://schemas.microsoft.com/office/drawing/2010/main" w="9525">
+                <a14:hiddenLine xmlns:a14="http://schemas.microsoft.com/office/drawing/2010/main" xmlns="" w="9525">
                   <a:solidFill>
                     <a:srgbClr val="000000"/>
                   </a:solidFill>
@@ -2256,7 +2256,7 @@
             </a:ln>
             <a:extLst>
               <a:ext uri="{91240B29-F687-4f45-9708-019B960494DF}">
-                <a14:hiddenLine xmlns="" xmlns:a14="http://schemas.microsoft.com/office/drawing/2010/main" w="9525">
+                <a14:hiddenLine xmlns:a14="http://schemas.microsoft.com/office/drawing/2010/main" xmlns="" w="9525">
                   <a:solidFill>
                     <a:srgbClr val="000000"/>
                   </a:solidFill>
@@ -2346,7 +2346,7 @@
             </a:ln>
             <a:extLst>
               <a:ext uri="{91240B29-F687-4f45-9708-019B960494DF}">
-                <a14:hiddenLine xmlns="" xmlns:a14="http://schemas.microsoft.com/office/drawing/2010/main" w="9525">
+                <a14:hiddenLine xmlns:a14="http://schemas.microsoft.com/office/drawing/2010/main" xmlns="" w="9525">
                   <a:solidFill>
                     <a:srgbClr val="000000"/>
                   </a:solidFill>
@@ -2436,7 +2436,7 @@
             </a:ln>
             <a:extLst>
               <a:ext uri="{91240B29-F687-4f45-9708-019B960494DF}">
-                <a14:hiddenLine xmlns="" xmlns:a14="http://schemas.microsoft.com/office/drawing/2010/main" w="9525">
+                <a14:hiddenLine xmlns:a14="http://schemas.microsoft.com/office/drawing/2010/main" xmlns="" w="9525">
                   <a:solidFill>
                     <a:srgbClr val="000000"/>
                   </a:solidFill>
@@ -2492,7 +2492,7 @@
             </a:ln>
             <a:extLst>
               <a:ext uri="{91240B29-F687-4f45-9708-019B960494DF}">
-                <a14:hiddenLine xmlns="" xmlns:a14="http://schemas.microsoft.com/office/drawing/2010/main" w="9525">
+                <a14:hiddenLine xmlns:a14="http://schemas.microsoft.com/office/drawing/2010/main" xmlns="" w="9525">
                   <a:solidFill>
                     <a:srgbClr val="000000"/>
                   </a:solidFill>
@@ -2582,7 +2582,7 @@
             </a:ln>
             <a:extLst>
               <a:ext uri="{91240B29-F687-4f45-9708-019B960494DF}">
-                <a14:hiddenLine xmlns="" xmlns:a14="http://schemas.microsoft.com/office/drawing/2010/main" w="9525">
+                <a14:hiddenLine xmlns:a14="http://schemas.microsoft.com/office/drawing/2010/main" xmlns="" w="9525">
                   <a:solidFill>
                     <a:srgbClr val="000000"/>
                   </a:solidFill>
@@ -2638,7 +2638,7 @@
             </a:ln>
             <a:extLst>
               <a:ext uri="{91240B29-F687-4f45-9708-019B960494DF}">
-                <a14:hiddenLine xmlns="" xmlns:a14="http://schemas.microsoft.com/office/drawing/2010/main" w="9525">
+                <a14:hiddenLine xmlns:a14="http://schemas.microsoft.com/office/drawing/2010/main" xmlns="" w="9525">
                   <a:solidFill>
                     <a:srgbClr val="000000"/>
                   </a:solidFill>
@@ -2728,7 +2728,7 @@
             </a:ln>
             <a:extLst>
               <a:ext uri="{91240B29-F687-4f45-9708-019B960494DF}">
-                <a14:hiddenLine xmlns="" xmlns:a14="http://schemas.microsoft.com/office/drawing/2010/main" w="9525">
+                <a14:hiddenLine xmlns:a14="http://schemas.microsoft.com/office/drawing/2010/main" xmlns="" w="9525">
                   <a:solidFill>
                     <a:srgbClr val="000000"/>
                   </a:solidFill>
@@ -2796,7 +2796,7 @@
             </a:ln>
             <a:extLst>
               <a:ext uri="{91240B29-F687-4f45-9708-019B960494DF}">
-                <a14:hiddenLine xmlns="" xmlns:a14="http://schemas.microsoft.com/office/drawing/2010/main" w="9525">
+                <a14:hiddenLine xmlns:a14="http://schemas.microsoft.com/office/drawing/2010/main" xmlns="" w="9525">
                   <a:solidFill>
                     <a:srgbClr val="000000"/>
                   </a:solidFill>
@@ -2886,7 +2886,7 @@
             </a:ln>
             <a:extLst>
               <a:ext uri="{91240B29-F687-4f45-9708-019B960494DF}">
-                <a14:hiddenLine xmlns="" xmlns:a14="http://schemas.microsoft.com/office/drawing/2010/main" w="9525">
+                <a14:hiddenLine xmlns:a14="http://schemas.microsoft.com/office/drawing/2010/main" xmlns="" w="9525">
                   <a:solidFill>
                     <a:srgbClr val="000000"/>
                   </a:solidFill>
@@ -2954,7 +2954,7 @@
             </a:ln>
             <a:extLst>
               <a:ext uri="{91240B29-F687-4f45-9708-019B960494DF}">
-                <a14:hiddenLine xmlns="" xmlns:a14="http://schemas.microsoft.com/office/drawing/2010/main" w="9525">
+                <a14:hiddenLine xmlns:a14="http://schemas.microsoft.com/office/drawing/2010/main" xmlns="" w="9525">
                   <a:solidFill>
                     <a:srgbClr val="000000"/>
                   </a:solidFill>
@@ -3044,7 +3044,7 @@
             </a:ln>
             <a:extLst>
               <a:ext uri="{91240B29-F687-4f45-9708-019B960494DF}">
-                <a14:hiddenLine xmlns="" xmlns:a14="http://schemas.microsoft.com/office/drawing/2010/main" w="9525">
+                <a14:hiddenLine xmlns:a14="http://schemas.microsoft.com/office/drawing/2010/main" xmlns="" w="9525">
                   <a:solidFill>
                     <a:srgbClr val="000000"/>
                   </a:solidFill>
@@ -3078,7 +3078,7 @@
             </a:ln>
             <a:extLst>
               <a:ext uri="{91240B29-F687-4f45-9708-019B960494DF}">
-                <a14:hiddenLine xmlns="" xmlns:a14="http://schemas.microsoft.com/office/drawing/2010/main" w="9525">
+                <a14:hiddenLine xmlns:a14="http://schemas.microsoft.com/office/drawing/2010/main" xmlns="" w="9525">
                   <a:solidFill>
                     <a:srgbClr val="000000"/>
                   </a:solidFill>
@@ -3168,7 +3168,7 @@
             </a:ln>
             <a:extLst>
               <a:ext uri="{91240B29-F687-4f45-9708-019B960494DF}">
-                <a14:hiddenLine xmlns="" xmlns:a14="http://schemas.microsoft.com/office/drawing/2010/main" w="9525">
+                <a14:hiddenLine xmlns:a14="http://schemas.microsoft.com/office/drawing/2010/main" xmlns="" w="9525">
                   <a:solidFill>
                     <a:srgbClr val="000000"/>
                   </a:solidFill>
@@ -3230,7 +3230,7 @@
             </a:ln>
             <a:extLst>
               <a:ext uri="{91240B29-F687-4f45-9708-019B960494DF}">
-                <a14:hiddenLine xmlns="" xmlns:a14="http://schemas.microsoft.com/office/drawing/2010/main" w="9525">
+                <a14:hiddenLine xmlns:a14="http://schemas.microsoft.com/office/drawing/2010/main" xmlns="" w="9525">
                   <a:solidFill>
                     <a:srgbClr val="000000"/>
                   </a:solidFill>
@@ -3292,7 +3292,7 @@
             </a:ln>
             <a:extLst>
               <a:ext uri="{91240B29-F687-4f45-9708-019B960494DF}">
-                <a14:hiddenLine xmlns="" xmlns:a14="http://schemas.microsoft.com/office/drawing/2010/main" w="9525">
+                <a14:hiddenLine xmlns:a14="http://schemas.microsoft.com/office/drawing/2010/main" xmlns="" w="9525">
                   <a:solidFill>
                     <a:srgbClr val="000000"/>
                   </a:solidFill>
@@ -3382,7 +3382,7 @@
             </a:ln>
             <a:extLst>
               <a:ext uri="{91240B29-F687-4f45-9708-019B960494DF}">
-                <a14:hiddenLine xmlns="" xmlns:a14="http://schemas.microsoft.com/office/drawing/2010/main" w="9525">
+                <a14:hiddenLine xmlns:a14="http://schemas.microsoft.com/office/drawing/2010/main" xmlns="" w="9525">
                   <a:solidFill>
                     <a:srgbClr val="000000"/>
                   </a:solidFill>
@@ -3450,7 +3450,7 @@
             </a:ln>
             <a:extLst>
               <a:ext uri="{91240B29-F687-4f45-9708-019B960494DF}">
-                <a14:hiddenLine xmlns="" xmlns:a14="http://schemas.microsoft.com/office/drawing/2010/main" w="9525">
+                <a14:hiddenLine xmlns:a14="http://schemas.microsoft.com/office/drawing/2010/main" xmlns="" w="9525">
                   <a:solidFill>
                     <a:srgbClr val="000000"/>
                   </a:solidFill>
@@ -3512,7 +3512,7 @@
             </a:ln>
             <a:extLst>
               <a:ext uri="{91240B29-F687-4f45-9708-019B960494DF}">
-                <a14:hiddenLine xmlns="" xmlns:a14="http://schemas.microsoft.com/office/drawing/2010/main" w="9525">
+                <a14:hiddenLine xmlns:a14="http://schemas.microsoft.com/office/drawing/2010/main" xmlns="" w="9525">
                   <a:solidFill>
                     <a:srgbClr val="000000"/>
                   </a:solidFill>
@@ -3602,7 +3602,7 @@
             </a:ln>
             <a:extLst>
               <a:ext uri="{91240B29-F687-4f45-9708-019B960494DF}">
-                <a14:hiddenLine xmlns="" xmlns:a14="http://schemas.microsoft.com/office/drawing/2010/main" w="9525">
+                <a14:hiddenLine xmlns:a14="http://schemas.microsoft.com/office/drawing/2010/main" xmlns="" w="9525">
                   <a:solidFill>
                     <a:srgbClr val="000000"/>
                   </a:solidFill>
@@ -3664,7 +3664,7 @@
             </a:ln>
             <a:extLst>
               <a:ext uri="{91240B29-F687-4f45-9708-019B960494DF}">
-                <a14:hiddenLine xmlns="" xmlns:a14="http://schemas.microsoft.com/office/drawing/2010/main" w="9525">
+                <a14:hiddenLine xmlns:a14="http://schemas.microsoft.com/office/drawing/2010/main" xmlns="" w="9525">
                   <a:solidFill>
                     <a:srgbClr val="000000"/>
                   </a:solidFill>
@@ -3754,7 +3754,7 @@
             </a:ln>
             <a:extLst>
               <a:ext uri="{91240B29-F687-4f45-9708-019B960494DF}">
-                <a14:hiddenLine xmlns="" xmlns:a14="http://schemas.microsoft.com/office/drawing/2010/main" w="9525">
+                <a14:hiddenLine xmlns:a14="http://schemas.microsoft.com/office/drawing/2010/main" xmlns="" w="9525">
                   <a:solidFill>
                     <a:srgbClr val="000000"/>
                   </a:solidFill>
@@ -3816,7 +3816,7 @@
             </a:ln>
             <a:extLst>
               <a:ext uri="{91240B29-F687-4f45-9708-019B960494DF}">
-                <a14:hiddenLine xmlns="" xmlns:a14="http://schemas.microsoft.com/office/drawing/2010/main" w="9525">
+                <a14:hiddenLine xmlns:a14="http://schemas.microsoft.com/office/drawing/2010/main" xmlns="" w="9525">
                   <a:solidFill>
                     <a:srgbClr val="000000"/>
                   </a:solidFill>
@@ -3906,7 +3906,7 @@
             </a:ln>
             <a:extLst>
               <a:ext uri="{91240B29-F687-4f45-9708-019B960494DF}">
-                <a14:hiddenLine xmlns="" xmlns:a14="http://schemas.microsoft.com/office/drawing/2010/main" w="9525">
+                <a14:hiddenLine xmlns:a14="http://schemas.microsoft.com/office/drawing/2010/main" xmlns="" w="9525">
                   <a:solidFill>
                     <a:srgbClr val="000000"/>
                   </a:solidFill>
@@ -3940,7 +3940,7 @@
             </a:ln>
             <a:extLst>
               <a:ext uri="{91240B29-F687-4f45-9708-019B960494DF}">
-                <a14:hiddenLine xmlns="" xmlns:a14="http://schemas.microsoft.com/office/drawing/2010/main" w="9525">
+                <a14:hiddenLine xmlns:a14="http://schemas.microsoft.com/office/drawing/2010/main" xmlns="" w="9525">
                   <a:solidFill>
                     <a:srgbClr val="000000"/>
                   </a:solidFill>
@@ -4005,7 +4005,7 @@
             </a:ln>
             <a:extLst>
               <a:ext uri="{91240B29-F687-4f45-9708-019B960494DF}">
-                <a14:hiddenLine xmlns="" xmlns:a14="http://schemas.microsoft.com/office/drawing/2010/main" w="9525">
+                <a14:hiddenLine xmlns:a14="http://schemas.microsoft.com/office/drawing/2010/main" xmlns="" w="9525">
                   <a:solidFill>
                     <a:srgbClr val="000000"/>
                   </a:solidFill>
@@ -4095,7 +4095,7 @@
             </a:ln>
             <a:extLst>
               <a:ext uri="{91240B29-F687-4f45-9708-019B960494DF}">
-                <a14:hiddenLine xmlns="" xmlns:a14="http://schemas.microsoft.com/office/drawing/2010/main" w="9525">
+                <a14:hiddenLine xmlns:a14="http://schemas.microsoft.com/office/drawing/2010/main" xmlns="" w="9525">
                   <a:solidFill>
                     <a:srgbClr val="000000"/>
                   </a:solidFill>
@@ -4157,7 +4157,7 @@
             </a:ln>
             <a:extLst>
               <a:ext uri="{91240B29-F687-4f45-9708-019B960494DF}">
-                <a14:hiddenLine xmlns="" xmlns:a14="http://schemas.microsoft.com/office/drawing/2010/main" w="9525">
+                <a14:hiddenLine xmlns:a14="http://schemas.microsoft.com/office/drawing/2010/main" xmlns="" w="9525">
                   <a:solidFill>
                     <a:srgbClr val="000000"/>
                   </a:solidFill>
@@ -4247,7 +4247,7 @@
             </a:ln>
             <a:extLst>
               <a:ext uri="{91240B29-F687-4f45-9708-019B960494DF}">
-                <a14:hiddenLine xmlns="" xmlns:a14="http://schemas.microsoft.com/office/drawing/2010/main" w="9525">
+                <a14:hiddenLine xmlns:a14="http://schemas.microsoft.com/office/drawing/2010/main" xmlns="" w="9525">
                   <a:solidFill>
                     <a:srgbClr val="000000"/>
                   </a:solidFill>
@@ -4337,7 +4337,7 @@
             </a:ln>
             <a:extLst>
               <a:ext uri="{91240B29-F687-4f45-9708-019B960494DF}">
-                <a14:hiddenLine xmlns="" xmlns:a14="http://schemas.microsoft.com/office/drawing/2010/main" w="9525">
+                <a14:hiddenLine xmlns:a14="http://schemas.microsoft.com/office/drawing/2010/main" xmlns="" w="9525">
                   <a:solidFill>
                     <a:srgbClr val="000000"/>
                   </a:solidFill>
@@ -4402,7 +4402,7 @@
             </a:ln>
             <a:extLst>
               <a:ext uri="{91240B29-F687-4f45-9708-019B960494DF}">
-                <a14:hiddenLine xmlns="" xmlns:a14="http://schemas.microsoft.com/office/drawing/2010/main" w="9525">
+                <a14:hiddenLine xmlns:a14="http://schemas.microsoft.com/office/drawing/2010/main" xmlns="" w="9525">
                   <a:solidFill>
                     <a:srgbClr val="000000"/>
                   </a:solidFill>
@@ -4464,7 +4464,7 @@
             </a:ln>
             <a:extLst>
               <a:ext uri="{91240B29-F687-4f45-9708-019B960494DF}">
-                <a14:hiddenLine xmlns="" xmlns:a14="http://schemas.microsoft.com/office/drawing/2010/main" w="9525">
+                <a14:hiddenLine xmlns:a14="http://schemas.microsoft.com/office/drawing/2010/main" xmlns="" w="9525">
                   <a:solidFill>
                     <a:srgbClr val="000000"/>
                   </a:solidFill>
@@ -4554,7 +4554,7 @@
             </a:ln>
             <a:extLst>
               <a:ext uri="{91240B29-F687-4f45-9708-019B960494DF}">
-                <a14:hiddenLine xmlns="" xmlns:a14="http://schemas.microsoft.com/office/drawing/2010/main" w="9525">
+                <a14:hiddenLine xmlns:a14="http://schemas.microsoft.com/office/drawing/2010/main" xmlns="" w="9525">
                   <a:solidFill>
                     <a:srgbClr val="000000"/>
                   </a:solidFill>
@@ -4644,7 +4644,7 @@
             </a:ln>
             <a:extLst>
               <a:ext uri="{91240B29-F687-4f45-9708-019B960494DF}">
-                <a14:hiddenLine xmlns="" xmlns:a14="http://schemas.microsoft.com/office/drawing/2010/main" w="9525">
+                <a14:hiddenLine xmlns:a14="http://schemas.microsoft.com/office/drawing/2010/main" xmlns="" w="9525">
                   <a:solidFill>
                     <a:srgbClr val="000000"/>
                   </a:solidFill>
@@ -4706,7 +4706,7 @@
             </a:ln>
             <a:extLst>
               <a:ext uri="{91240B29-F687-4f45-9708-019B960494DF}">
-                <a14:hiddenLine xmlns="" xmlns:a14="http://schemas.microsoft.com/office/drawing/2010/main" w="9525">
+                <a14:hiddenLine xmlns:a14="http://schemas.microsoft.com/office/drawing/2010/main" xmlns="" w="9525">
                   <a:solidFill>
                     <a:srgbClr val="000000"/>
                   </a:solidFill>
@@ -4826,7 +4826,7 @@
             </a:ln>
             <a:extLst>
               <a:ext uri="{91240B29-F687-4f45-9708-019B960494DF}">
-                <a14:hiddenLine xmlns="" xmlns:a14="http://schemas.microsoft.com/office/drawing/2010/main" w="9525">
+                <a14:hiddenLine xmlns:a14="http://schemas.microsoft.com/office/drawing/2010/main" xmlns="" w="9525">
                   <a:solidFill>
                     <a:srgbClr val="000000"/>
                   </a:solidFill>
@@ -4894,7 +4894,7 @@
             </a:ln>
             <a:extLst>
               <a:ext uri="{91240B29-F687-4f45-9708-019B960494DF}">
-                <a14:hiddenLine xmlns="" xmlns:a14="http://schemas.microsoft.com/office/drawing/2010/main" w="9525">
+                <a14:hiddenLine xmlns:a14="http://schemas.microsoft.com/office/drawing/2010/main" xmlns="" w="9525">
                   <a:solidFill>
                     <a:srgbClr val="000000"/>
                   </a:solidFill>
@@ -4984,7 +4984,7 @@
             </a:ln>
             <a:extLst>
               <a:ext uri="{91240B29-F687-4f45-9708-019B960494DF}">
-                <a14:hiddenLine xmlns="" xmlns:a14="http://schemas.microsoft.com/office/drawing/2010/main" w="9525">
+                <a14:hiddenLine xmlns:a14="http://schemas.microsoft.com/office/drawing/2010/main" xmlns="" w="9525">
                   <a:solidFill>
                     <a:srgbClr val="000000"/>
                   </a:solidFill>
@@ -5124,7 +5124,7 @@
           <a:p>
             <a:fld id="{EC4347D3-4C9A-C240-8F14-750059DFEEB0}" type="datetimeFigureOut">
               <a:rPr lang="en-US" smtClean="0"/>
-              <a:t>2/3/26</a:t>
+              <a:t>2/5/26</a:t>
             </a:fld>
             <a:endParaRPr lang="en-US"/>
           </a:p>
@@ -5391,7 +5391,7 @@
           <a:p>
             <a:fld id="{EC4347D3-4C9A-C240-8F14-750059DFEEB0}" type="datetimeFigureOut">
               <a:rPr lang="en-US" smtClean="0"/>
-              <a:t>2/3/26</a:t>
+              <a:t>2/5/26</a:t>
             </a:fld>
             <a:endParaRPr lang="en-US"/>
           </a:p>
@@ -5587,7 +5587,7 @@
           <a:p>
             <a:fld id="{EC4347D3-4C9A-C240-8F14-750059DFEEB0}" type="datetimeFigureOut">
               <a:rPr lang="en-US" smtClean="0"/>
-              <a:t>2/3/26</a:t>
+              <a:t>2/5/26</a:t>
             </a:fld>
             <a:endParaRPr lang="en-US"/>
           </a:p>
@@ -5850,7 +5850,7 @@
           <a:p>
             <a:fld id="{EC4347D3-4C9A-C240-8F14-750059DFEEB0}" type="datetimeFigureOut">
               <a:rPr lang="en-US" smtClean="0"/>
-              <a:t>2/3/26</a:t>
+              <a:t>2/5/26</a:t>
             </a:fld>
             <a:endParaRPr lang="en-US"/>
           </a:p>
@@ -6284,7 +6284,7 @@
           <a:p>
             <a:fld id="{EC4347D3-4C9A-C240-8F14-750059DFEEB0}" type="datetimeFigureOut">
               <a:rPr lang="en-US" smtClean="0"/>
-              <a:t>2/3/26</a:t>
+              <a:t>2/5/26</a:t>
             </a:fld>
             <a:endParaRPr lang="en-US"/>
           </a:p>
@@ -6830,7 +6830,7 @@
           <a:p>
             <a:fld id="{EC4347D3-4C9A-C240-8F14-750059DFEEB0}" type="datetimeFigureOut">
               <a:rPr lang="en-US" smtClean="0"/>
-              <a:t>2/3/26</a:t>
+              <a:t>2/5/26</a:t>
             </a:fld>
             <a:endParaRPr lang="en-US"/>
           </a:p>
@@ -7550,7 +7550,7 @@
           <a:p>
             <a:fld id="{EC4347D3-4C9A-C240-8F14-750059DFEEB0}" type="datetimeFigureOut">
               <a:rPr lang="en-US" smtClean="0"/>
-              <a:t>2/3/26</a:t>
+              <a:t>2/5/26</a:t>
             </a:fld>
             <a:endParaRPr lang="en-US"/>
           </a:p>
@@ -7720,7 +7720,7 @@
           <a:p>
             <a:fld id="{EC4347D3-4C9A-C240-8F14-750059DFEEB0}" type="datetimeFigureOut">
               <a:rPr lang="en-US" smtClean="0"/>
-              <a:t>2/3/26</a:t>
+              <a:t>2/5/26</a:t>
             </a:fld>
             <a:endParaRPr lang="en-US"/>
           </a:p>
@@ -7900,7 +7900,7 @@
           <a:p>
             <a:fld id="{EC4347D3-4C9A-C240-8F14-750059DFEEB0}" type="datetimeFigureOut">
               <a:rPr lang="en-US" smtClean="0"/>
-              <a:t>2/3/26</a:t>
+              <a:t>2/5/26</a:t>
             </a:fld>
             <a:endParaRPr lang="en-US"/>
           </a:p>
@@ -8070,7 +8070,7 @@
           <a:p>
             <a:fld id="{EC4347D3-4C9A-C240-8F14-750059DFEEB0}" type="datetimeFigureOut">
               <a:rPr lang="en-US" smtClean="0"/>
-              <a:t>2/3/26</a:t>
+              <a:t>2/5/26</a:t>
             </a:fld>
             <a:endParaRPr lang="en-US"/>
           </a:p>
@@ -8320,7 +8320,7 @@
           <a:p>
             <a:fld id="{EC4347D3-4C9A-C240-8F14-750059DFEEB0}" type="datetimeFigureOut">
               <a:rPr lang="en-US" smtClean="0"/>
-              <a:t>2/3/26</a:t>
+              <a:t>2/5/26</a:t>
             </a:fld>
             <a:endParaRPr lang="en-US"/>
           </a:p>
@@ -8552,7 +8552,7 @@
           <a:p>
             <a:fld id="{EC4347D3-4C9A-C240-8F14-750059DFEEB0}" type="datetimeFigureOut">
               <a:rPr lang="en-US" smtClean="0"/>
-              <a:t>2/3/26</a:t>
+              <a:t>2/5/26</a:t>
             </a:fld>
             <a:endParaRPr lang="en-US"/>
           </a:p>
@@ -8938,7 +8938,7 @@
           <a:p>
             <a:fld id="{EC4347D3-4C9A-C240-8F14-750059DFEEB0}" type="datetimeFigureOut">
               <a:rPr lang="en-US" smtClean="0"/>
-              <a:t>2/3/26</a:t>
+              <a:t>2/5/26</a:t>
             </a:fld>
             <a:endParaRPr lang="en-US"/>
           </a:p>
@@ -9061,7 +9061,7 @@
           <a:p>
             <a:fld id="{EC4347D3-4C9A-C240-8F14-750059DFEEB0}" type="datetimeFigureOut">
               <a:rPr lang="en-US" smtClean="0"/>
-              <a:t>2/3/26</a:t>
+              <a:t>2/5/26</a:t>
             </a:fld>
             <a:endParaRPr lang="en-US"/>
           </a:p>
@@ -9156,7 +9156,7 @@
           <a:p>
             <a:fld id="{EC4347D3-4C9A-C240-8F14-750059DFEEB0}" type="datetimeFigureOut">
               <a:rPr lang="en-US" smtClean="0"/>
-              <a:t>2/3/26</a:t>
+              <a:t>2/5/26</a:t>
             </a:fld>
             <a:endParaRPr lang="en-US"/>
           </a:p>
@@ -9405,7 +9405,7 @@
           <a:p>
             <a:fld id="{EC4347D3-4C9A-C240-8F14-750059DFEEB0}" type="datetimeFigureOut">
               <a:rPr lang="en-US" smtClean="0"/>
-              <a:t>2/3/26</a:t>
+              <a:t>2/5/26</a:t>
             </a:fld>
             <a:endParaRPr lang="en-US"/>
           </a:p>
@@ -9690,7 +9690,7 @@
           <a:p>
             <a:fld id="{EC4347D3-4C9A-C240-8F14-750059DFEEB0}" type="datetimeFigureOut">
               <a:rPr lang="en-US" smtClean="0"/>
-              <a:t>2/3/26</a:t>
+              <a:t>2/5/26</a:t>
             </a:fld>
             <a:endParaRPr lang="en-US"/>
           </a:p>
@@ -9813,7 +9813,7 @@
           <a:noFill/>
           <a:extLst>
             <a:ext uri="{909E8E84-426E-40dd-AFC4-6F175D3DCCD1}">
-              <a14:hiddenFill xmlns="" xmlns:a14="http://schemas.microsoft.com/office/drawing/2010/main">
+              <a14:hiddenFill xmlns:a14="http://schemas.microsoft.com/office/drawing/2010/main" xmlns="">
                 <a:solidFill>
                   <a:srgbClr val="FFFFFF"/>
                 </a:solidFill>
@@ -9887,7 +9887,7 @@
               </a:ln>
               <a:extLst>
                 <a:ext uri="{91240B29-F687-4f45-9708-019B960494DF}">
-                  <a14:hiddenLine xmlns="" xmlns:a14="http://schemas.microsoft.com/office/drawing/2010/main" w="9525">
+                  <a14:hiddenLine xmlns:a14="http://schemas.microsoft.com/office/drawing/2010/main" xmlns="" w="9525">
                     <a:solidFill>
                       <a:srgbClr val="000000"/>
                     </a:solidFill>
@@ -9977,7 +9977,7 @@
               </a:ln>
               <a:extLst>
                 <a:ext uri="{91240B29-F687-4f45-9708-019B960494DF}">
-                  <a14:hiddenLine xmlns="" xmlns:a14="http://schemas.microsoft.com/office/drawing/2010/main" w="9525">
+                  <a14:hiddenLine xmlns:a14="http://schemas.microsoft.com/office/drawing/2010/main" xmlns="" w="9525">
                     <a:solidFill>
                       <a:srgbClr val="000000"/>
                     </a:solidFill>
@@ -10067,7 +10067,7 @@
               </a:ln>
               <a:extLst>
                 <a:ext uri="{91240B29-F687-4f45-9708-019B960494DF}">
-                  <a14:hiddenLine xmlns="" xmlns:a14="http://schemas.microsoft.com/office/drawing/2010/main" w="9525">
+                  <a14:hiddenLine xmlns:a14="http://schemas.microsoft.com/office/drawing/2010/main" xmlns="" w="9525">
                     <a:solidFill>
                       <a:srgbClr val="000000"/>
                     </a:solidFill>
@@ -10129,7 +10129,7 @@
               </a:ln>
               <a:extLst>
                 <a:ext uri="{91240B29-F687-4f45-9708-019B960494DF}">
-                  <a14:hiddenLine xmlns="" xmlns:a14="http://schemas.microsoft.com/office/drawing/2010/main" w="9525">
+                  <a14:hiddenLine xmlns:a14="http://schemas.microsoft.com/office/drawing/2010/main" xmlns="" w="9525">
                     <a:solidFill>
                       <a:srgbClr val="000000"/>
                     </a:solidFill>
@@ -10219,7 +10219,7 @@
               </a:ln>
               <a:extLst>
                 <a:ext uri="{91240B29-F687-4f45-9708-019B960494DF}">
-                  <a14:hiddenLine xmlns="" xmlns:a14="http://schemas.microsoft.com/office/drawing/2010/main" w="9525">
+                  <a14:hiddenLine xmlns:a14="http://schemas.microsoft.com/office/drawing/2010/main" xmlns="" w="9525">
                     <a:solidFill>
                       <a:srgbClr val="000000"/>
                     </a:solidFill>
@@ -10281,7 +10281,7 @@
               </a:ln>
               <a:extLst>
                 <a:ext uri="{91240B29-F687-4f45-9708-019B960494DF}">
-                  <a14:hiddenLine xmlns="" xmlns:a14="http://schemas.microsoft.com/office/drawing/2010/main" w="9525">
+                  <a14:hiddenLine xmlns:a14="http://schemas.microsoft.com/office/drawing/2010/main" xmlns="" w="9525">
                     <a:solidFill>
                       <a:srgbClr val="000000"/>
                     </a:solidFill>
@@ -10343,7 +10343,7 @@
               </a:ln>
               <a:extLst>
                 <a:ext uri="{91240B29-F687-4f45-9708-019B960494DF}">
-                  <a14:hiddenLine xmlns="" xmlns:a14="http://schemas.microsoft.com/office/drawing/2010/main" w="9525">
+                  <a14:hiddenLine xmlns:a14="http://schemas.microsoft.com/office/drawing/2010/main" xmlns="" w="9525">
                     <a:solidFill>
                       <a:srgbClr val="000000"/>
                     </a:solidFill>
@@ -10433,7 +10433,7 @@
               </a:ln>
               <a:extLst>
                 <a:ext uri="{91240B29-F687-4f45-9708-019B960494DF}">
-                  <a14:hiddenLine xmlns="" xmlns:a14="http://schemas.microsoft.com/office/drawing/2010/main" w="9525">
+                  <a14:hiddenLine xmlns:a14="http://schemas.microsoft.com/office/drawing/2010/main" xmlns="" w="9525">
                     <a:solidFill>
                       <a:srgbClr val="000000"/>
                     </a:solidFill>
@@ -10523,7 +10523,7 @@
               </a:ln>
               <a:extLst>
                 <a:ext uri="{91240B29-F687-4f45-9708-019B960494DF}">
-                  <a14:hiddenLine xmlns="" xmlns:a14="http://schemas.microsoft.com/office/drawing/2010/main" w="9525">
+                  <a14:hiddenLine xmlns:a14="http://schemas.microsoft.com/office/drawing/2010/main" xmlns="" w="9525">
                     <a:solidFill>
                       <a:srgbClr val="000000"/>
                     </a:solidFill>
@@ -10585,7 +10585,7 @@
               </a:ln>
               <a:extLst>
                 <a:ext uri="{91240B29-F687-4f45-9708-019B960494DF}">
-                  <a14:hiddenLine xmlns="" xmlns:a14="http://schemas.microsoft.com/office/drawing/2010/main" w="9525">
+                  <a14:hiddenLine xmlns:a14="http://schemas.microsoft.com/office/drawing/2010/main" xmlns="" w="9525">
                     <a:solidFill>
                       <a:srgbClr val="000000"/>
                     </a:solidFill>
@@ -10695,7 +10695,7 @@
               </a:ln>
               <a:extLst>
                 <a:ext uri="{91240B29-F687-4f45-9708-019B960494DF}">
-                  <a14:hiddenLine xmlns="" xmlns:a14="http://schemas.microsoft.com/office/drawing/2010/main" w="9525">
+                  <a14:hiddenLine xmlns:a14="http://schemas.microsoft.com/office/drawing/2010/main" xmlns="" w="9525">
                     <a:solidFill>
                       <a:srgbClr val="000000"/>
                     </a:solidFill>
@@ -10779,7 +10779,7 @@
               </a:ln>
               <a:extLst>
                 <a:ext uri="{91240B29-F687-4f45-9708-019B960494DF}">
-                  <a14:hiddenLine xmlns="" xmlns:a14="http://schemas.microsoft.com/office/drawing/2010/main" w="9525">
+                  <a14:hiddenLine xmlns:a14="http://schemas.microsoft.com/office/drawing/2010/main" xmlns="" w="9525">
                     <a:solidFill>
                       <a:srgbClr val="000000"/>
                     </a:solidFill>
@@ -10841,7 +10841,7 @@
               </a:ln>
               <a:extLst>
                 <a:ext uri="{91240B29-F687-4f45-9708-019B960494DF}">
-                  <a14:hiddenLine xmlns="" xmlns:a14="http://schemas.microsoft.com/office/drawing/2010/main" w="9525">
+                  <a14:hiddenLine xmlns:a14="http://schemas.microsoft.com/office/drawing/2010/main" xmlns="" w="9525">
                     <a:solidFill>
                       <a:srgbClr val="000000"/>
                     </a:solidFill>
@@ -10903,7 +10903,7 @@
               </a:ln>
               <a:extLst>
                 <a:ext uri="{91240B29-F687-4f45-9708-019B960494DF}">
-                  <a14:hiddenLine xmlns="" xmlns:a14="http://schemas.microsoft.com/office/drawing/2010/main" w="9525">
+                  <a14:hiddenLine xmlns:a14="http://schemas.microsoft.com/office/drawing/2010/main" xmlns="" w="9525">
                     <a:solidFill>
                       <a:srgbClr val="000000"/>
                     </a:solidFill>
@@ -10993,7 +10993,7 @@
               </a:ln>
               <a:extLst>
                 <a:ext uri="{91240B29-F687-4f45-9708-019B960494DF}">
-                  <a14:hiddenLine xmlns="" xmlns:a14="http://schemas.microsoft.com/office/drawing/2010/main" w="9525">
+                  <a14:hiddenLine xmlns:a14="http://schemas.microsoft.com/office/drawing/2010/main" xmlns="" w="9525">
                     <a:solidFill>
                       <a:srgbClr val="000000"/>
                     </a:solidFill>
@@ -11027,7 +11027,7 @@
               </a:ln>
               <a:extLst>
                 <a:ext uri="{91240B29-F687-4f45-9708-019B960494DF}">
-                  <a14:hiddenLine xmlns="" xmlns:a14="http://schemas.microsoft.com/office/drawing/2010/main" w="9525">
+                  <a14:hiddenLine xmlns:a14="http://schemas.microsoft.com/office/drawing/2010/main" xmlns="" w="9525">
                     <a:solidFill>
                       <a:srgbClr val="000000"/>
                     </a:solidFill>
@@ -11092,7 +11092,7 @@
               </a:ln>
               <a:extLst>
                 <a:ext uri="{91240B29-F687-4f45-9708-019B960494DF}">
-                  <a14:hiddenLine xmlns="" xmlns:a14="http://schemas.microsoft.com/office/drawing/2010/main" w="9525">
+                  <a14:hiddenLine xmlns:a14="http://schemas.microsoft.com/office/drawing/2010/main" xmlns="" w="9525">
                     <a:solidFill>
                       <a:srgbClr val="000000"/>
                     </a:solidFill>
@@ -11182,7 +11182,7 @@
               </a:ln>
               <a:extLst>
                 <a:ext uri="{91240B29-F687-4f45-9708-019B960494DF}">
-                  <a14:hiddenLine xmlns="" xmlns:a14="http://schemas.microsoft.com/office/drawing/2010/main" w="9525">
+                  <a14:hiddenLine xmlns:a14="http://schemas.microsoft.com/office/drawing/2010/main" xmlns="" w="9525">
                     <a:solidFill>
                       <a:srgbClr val="000000"/>
                     </a:solidFill>
@@ -11244,7 +11244,7 @@
               </a:ln>
               <a:extLst>
                 <a:ext uri="{91240B29-F687-4f45-9708-019B960494DF}">
-                  <a14:hiddenLine xmlns="" xmlns:a14="http://schemas.microsoft.com/office/drawing/2010/main" w="9525">
+                  <a14:hiddenLine xmlns:a14="http://schemas.microsoft.com/office/drawing/2010/main" xmlns="" w="9525">
                     <a:solidFill>
                       <a:srgbClr val="000000"/>
                     </a:solidFill>
@@ -11334,7 +11334,7 @@
               </a:ln>
               <a:extLst>
                 <a:ext uri="{91240B29-F687-4f45-9708-019B960494DF}">
-                  <a14:hiddenLine xmlns="" xmlns:a14="http://schemas.microsoft.com/office/drawing/2010/main" w="9525">
+                  <a14:hiddenLine xmlns:a14="http://schemas.microsoft.com/office/drawing/2010/main" xmlns="" w="9525">
                     <a:solidFill>
                       <a:srgbClr val="000000"/>
                     </a:solidFill>
@@ -11399,7 +11399,7 @@
               </a:ln>
               <a:extLst>
                 <a:ext uri="{91240B29-F687-4f45-9708-019B960494DF}">
-                  <a14:hiddenLine xmlns="" xmlns:a14="http://schemas.microsoft.com/office/drawing/2010/main" w="9525">
+                  <a14:hiddenLine xmlns:a14="http://schemas.microsoft.com/office/drawing/2010/main" xmlns="" w="9525">
                     <a:solidFill>
                       <a:srgbClr val="000000"/>
                     </a:solidFill>
@@ -11461,7 +11461,7 @@
               </a:ln>
               <a:extLst>
                 <a:ext uri="{91240B29-F687-4f45-9708-019B960494DF}">
-                  <a14:hiddenLine xmlns="" xmlns:a14="http://schemas.microsoft.com/office/drawing/2010/main" w="9525">
+                  <a14:hiddenLine xmlns:a14="http://schemas.microsoft.com/office/drawing/2010/main" xmlns="" w="9525">
                     <a:solidFill>
                       <a:srgbClr val="000000"/>
                     </a:solidFill>
@@ -11551,7 +11551,7 @@
               </a:ln>
               <a:extLst>
                 <a:ext uri="{91240B29-F687-4f45-9708-019B960494DF}">
-                  <a14:hiddenLine xmlns="" xmlns:a14="http://schemas.microsoft.com/office/drawing/2010/main" w="9525">
+                  <a14:hiddenLine xmlns:a14="http://schemas.microsoft.com/office/drawing/2010/main" xmlns="" w="9525">
                     <a:solidFill>
                       <a:srgbClr val="000000"/>
                     </a:solidFill>
@@ -11641,7 +11641,7 @@
               </a:ln>
               <a:extLst>
                 <a:ext uri="{91240B29-F687-4f45-9708-019B960494DF}">
-                  <a14:hiddenLine xmlns="" xmlns:a14="http://schemas.microsoft.com/office/drawing/2010/main" w="9525">
+                  <a14:hiddenLine xmlns:a14="http://schemas.microsoft.com/office/drawing/2010/main" xmlns="" w="9525">
                     <a:solidFill>
                       <a:srgbClr val="000000"/>
                     </a:solidFill>
@@ -11706,7 +11706,7 @@
               </a:ln>
               <a:extLst>
                 <a:ext uri="{91240B29-F687-4f45-9708-019B960494DF}">
-                  <a14:hiddenLine xmlns="" xmlns:a14="http://schemas.microsoft.com/office/drawing/2010/main" w="9525">
+                  <a14:hiddenLine xmlns:a14="http://schemas.microsoft.com/office/drawing/2010/main" xmlns="" w="9525">
                     <a:solidFill>
                       <a:srgbClr val="000000"/>
                     </a:solidFill>
@@ -11826,7 +11826,7 @@
               </a:ln>
               <a:extLst>
                 <a:ext uri="{91240B29-F687-4f45-9708-019B960494DF}">
-                  <a14:hiddenLine xmlns="" xmlns:a14="http://schemas.microsoft.com/office/drawing/2010/main" w="9525">
+                  <a14:hiddenLine xmlns:a14="http://schemas.microsoft.com/office/drawing/2010/main" xmlns="" w="9525">
                     <a:solidFill>
                       <a:srgbClr val="000000"/>
                     </a:solidFill>
@@ -11907,7 +11907,7 @@
               </a:ln>
               <a:extLst>
                 <a:ext uri="{91240B29-F687-4f45-9708-019B960494DF}">
-                  <a14:hiddenLine xmlns="" xmlns:a14="http://schemas.microsoft.com/office/drawing/2010/main" w="9525">
+                  <a14:hiddenLine xmlns:a14="http://schemas.microsoft.com/office/drawing/2010/main" xmlns="" w="9525">
                     <a:solidFill>
                       <a:srgbClr val="000000"/>
                     </a:solidFill>
@@ -12022,7 +12022,7 @@
               </a:ln>
               <a:extLst>
                 <a:ext uri="{91240B29-F687-4f45-9708-019B960494DF}">
-                  <a14:hiddenLine xmlns="" xmlns:a14="http://schemas.microsoft.com/office/drawing/2010/main" w="9525">
+                  <a14:hiddenLine xmlns:a14="http://schemas.microsoft.com/office/drawing/2010/main" xmlns="" w="9525">
                     <a:solidFill>
                       <a:srgbClr val="000000"/>
                     </a:solidFill>
@@ -12112,7 +12112,7 @@
               </a:ln>
               <a:extLst>
                 <a:ext uri="{91240B29-F687-4f45-9708-019B960494DF}">
-                  <a14:hiddenLine xmlns="" xmlns:a14="http://schemas.microsoft.com/office/drawing/2010/main" w="9525">
+                  <a14:hiddenLine xmlns:a14="http://schemas.microsoft.com/office/drawing/2010/main" xmlns="" w="9525">
                     <a:solidFill>
                       <a:srgbClr val="000000"/>
                     </a:solidFill>
@@ -12177,7 +12177,7 @@
               </a:ln>
               <a:extLst>
                 <a:ext uri="{91240B29-F687-4f45-9708-019B960494DF}">
-                  <a14:hiddenLine xmlns="" xmlns:a14="http://schemas.microsoft.com/office/drawing/2010/main" w="9525">
+                  <a14:hiddenLine xmlns:a14="http://schemas.microsoft.com/office/drawing/2010/main" xmlns="" w="9525">
                     <a:solidFill>
                       <a:srgbClr val="000000"/>
                     </a:solidFill>
@@ -12267,7 +12267,7 @@
               </a:ln>
               <a:extLst>
                 <a:ext uri="{91240B29-F687-4f45-9708-019B960494DF}">
-                  <a14:hiddenLine xmlns="" xmlns:a14="http://schemas.microsoft.com/office/drawing/2010/main" w="9525">
+                  <a14:hiddenLine xmlns:a14="http://schemas.microsoft.com/office/drawing/2010/main" xmlns="" w="9525">
                     <a:solidFill>
                       <a:srgbClr val="000000"/>
                     </a:solidFill>
@@ -12335,7 +12335,7 @@
               </a:ln>
               <a:extLst>
                 <a:ext uri="{91240B29-F687-4f45-9708-019B960494DF}">
-                  <a14:hiddenLine xmlns="" xmlns:a14="http://schemas.microsoft.com/office/drawing/2010/main" w="9525">
+                  <a14:hiddenLine xmlns:a14="http://schemas.microsoft.com/office/drawing/2010/main" xmlns="" w="9525">
                     <a:solidFill>
                       <a:srgbClr val="000000"/>
                     </a:solidFill>
@@ -12425,7 +12425,7 @@
               </a:ln>
               <a:extLst>
                 <a:ext uri="{91240B29-F687-4f45-9708-019B960494DF}">
-                  <a14:hiddenLine xmlns="" xmlns:a14="http://schemas.microsoft.com/office/drawing/2010/main" w="9525">
+                  <a14:hiddenLine xmlns:a14="http://schemas.microsoft.com/office/drawing/2010/main" xmlns="" w="9525">
                     <a:solidFill>
                       <a:srgbClr val="000000"/>
                     </a:solidFill>
@@ -12493,7 +12493,7 @@
               </a:ln>
               <a:extLst>
                 <a:ext uri="{91240B29-F687-4f45-9708-019B960494DF}">
-                  <a14:hiddenLine xmlns="" xmlns:a14="http://schemas.microsoft.com/office/drawing/2010/main" w="9525">
+                  <a14:hiddenLine xmlns:a14="http://schemas.microsoft.com/office/drawing/2010/main" xmlns="" w="9525">
                     <a:solidFill>
                       <a:srgbClr val="000000"/>
                     </a:solidFill>
@@ -12583,7 +12583,7 @@
               </a:ln>
               <a:extLst>
                 <a:ext uri="{91240B29-F687-4f45-9708-019B960494DF}">
-                  <a14:hiddenLine xmlns="" xmlns:a14="http://schemas.microsoft.com/office/drawing/2010/main" w="9525">
+                  <a14:hiddenLine xmlns:a14="http://schemas.microsoft.com/office/drawing/2010/main" xmlns="" w="9525">
                     <a:solidFill>
                       <a:srgbClr val="000000"/>
                     </a:solidFill>
@@ -12617,7 +12617,7 @@
               </a:ln>
               <a:extLst>
                 <a:ext uri="{91240B29-F687-4f45-9708-019B960494DF}">
-                  <a14:hiddenLine xmlns="" xmlns:a14="http://schemas.microsoft.com/office/drawing/2010/main" w="9525">
+                  <a14:hiddenLine xmlns:a14="http://schemas.microsoft.com/office/drawing/2010/main" xmlns="" w="9525">
                     <a:solidFill>
                       <a:srgbClr val="000000"/>
                     </a:solidFill>
@@ -12757,7 +12757,7 @@
           <a:p>
             <a:fld id="{EC4347D3-4C9A-C240-8F14-750059DFEEB0}" type="datetimeFigureOut">
               <a:rPr lang="en-US" smtClean="0"/>
-              <a:t>2/3/26</a:t>
+              <a:t>2/5/26</a:t>
             </a:fld>
             <a:endParaRPr lang="en-US"/>
           </a:p>
@@ -42268,8 +42268,8 @@
           </p:nvSpPr>
           <p:spPr>
             <a:xfrm>
-              <a:off x="9457772" y="4893499"/>
-              <a:ext cx="319318" cy="369332"/>
+              <a:off x="9457771" y="4893499"/>
+              <a:ext cx="410125" cy="369332"/>
             </a:xfrm>
             <a:prstGeom prst="rect">
               <a:avLst/>
@@ -42296,7 +42296,7 @@
                     <a:schemeClr val="accent3"/>
                   </a:solidFill>
                 </a:rPr>
-                <a:t>l</a:t>
+                <a:t>R</a:t>
               </a:r>
             </a:p>
           </p:txBody>
@@ -44587,8 +44587,8 @@
             </p:nvSpPr>
             <p:spPr>
               <a:xfrm>
-                <a:off x="9457772" y="4893499"/>
-                <a:ext cx="319318" cy="369332"/>
+                <a:off x="9457771" y="4893499"/>
+                <a:ext cx="410127" cy="369332"/>
               </a:xfrm>
               <a:prstGeom prst="rect">
                 <a:avLst/>
@@ -44615,7 +44615,7 @@
                       <a:schemeClr val="accent3"/>
                     </a:solidFill>
                   </a:rPr>
-                  <a:t>l</a:t>
+                  <a:t>R</a:t>
                 </a:r>
               </a:p>
             </p:txBody>

</xml_diff>